<commit_message>
7th Commit of the Project
</commit_message>
<xml_diff>
--- a/Niels Mejia Final Homework Presentation.pptx
+++ b/Niels Mejia Final Homework Presentation.pptx
@@ -105,13 +105,18 @@
       </a:defRPr>
     </a:lvl9pPr>
   </p:defaultTextStyle>
+  <p:extLst>
+    <p:ext uri="{EFAFB233-063F-42B5-8137-9DF3F51BA10A}">
+      <p15:sldGuideLst xmlns:p15="http://schemas.microsoft.com/office/powerpoint/2012/main"/>
+    </p:ext>
+  </p:extLst>
 </p:presentation>
 </file>
 
 <file path=ppt/revisionInfo.xml><?xml version="1.0" encoding="utf-8"?>
 <p1510:revInfo xmlns:a="http://schemas.openxmlformats.org/drawingml/2006/main" xmlns:r="http://schemas.openxmlformats.org/officeDocument/2006/relationships" xmlns:p1510="http://schemas.microsoft.com/office/powerpoint/2015/10/main">
   <p1510:revLst>
-    <p1510:client id="{9235F258-DE90-4FB1-9EFC-857F96B3346F}" v="11" dt="2024-06-14T20:29:35.499"/>
+    <p1510:client id="{9235F258-DE90-4FB1-9EFC-857F96B3346F}" v="17" dt="2024-06-17T22:43:58.829"/>
   </p1510:revLst>
 </p1510:revInfo>
 </file>
@@ -120,19 +125,67 @@
 <pc:chgInfo xmlns:a="http://schemas.openxmlformats.org/drawingml/2006/main" xmlns:r="http://schemas.openxmlformats.org/officeDocument/2006/relationships" xmlns:ac="http://schemas.microsoft.com/office/drawing/2013/main/command" xmlns:pc="http://schemas.microsoft.com/office/powerpoint/2013/main/command">
   <pc:docChgLst>
     <pc:chgData name="Niels Mejia" userId="6a908e1cffa05844" providerId="LiveId" clId="{9235F258-DE90-4FB1-9EFC-857F96B3346F}"/>
-    <pc:docChg chg="custSel addSld modSld">
-      <pc:chgData name="Niels Mejia" userId="6a908e1cffa05844" providerId="LiveId" clId="{9235F258-DE90-4FB1-9EFC-857F96B3346F}" dt="2024-06-14T21:13:00.096" v="476" actId="20577"/>
+    <pc:docChg chg="undo custSel addSld modSld">
+      <pc:chgData name="Niels Mejia" userId="6a908e1cffa05844" providerId="LiveId" clId="{9235F258-DE90-4FB1-9EFC-857F96B3346F}" dt="2024-06-17T22:45:32.174" v="653" actId="242"/>
       <pc:docMkLst>
         <pc:docMk/>
       </pc:docMkLst>
-      <pc:sldChg chg="addSp modSp mod">
-        <pc:chgData name="Niels Mejia" userId="6a908e1cffa05844" providerId="LiveId" clId="{9235F258-DE90-4FB1-9EFC-857F96B3346F}" dt="2024-06-14T20:30:25.227" v="267" actId="1076"/>
+      <pc:sldChg chg="addSp delSp modSp mod">
+        <pc:chgData name="Niels Mejia" userId="6a908e1cffa05844" providerId="LiveId" clId="{9235F258-DE90-4FB1-9EFC-857F96B3346F}" dt="2024-06-17T22:44:16.135" v="628" actId="20577"/>
         <pc:sldMkLst>
           <pc:docMk/>
           <pc:sldMk cId="3338301109" sldId="256"/>
         </pc:sldMkLst>
+        <pc:spChg chg="add mod">
+          <ac:chgData name="Niels Mejia" userId="6a908e1cffa05844" providerId="LiveId" clId="{9235F258-DE90-4FB1-9EFC-857F96B3346F}" dt="2024-06-17T22:38:27.386" v="489" actId="20577"/>
+          <ac:spMkLst>
+            <pc:docMk/>
+            <pc:sldMk cId="3338301109" sldId="256"/>
+            <ac:spMk id="2" creationId="{147B1A8A-7D88-ECE1-3034-54A57B97D430}"/>
+          </ac:spMkLst>
+        </pc:spChg>
+        <pc:spChg chg="add mod">
+          <ac:chgData name="Niels Mejia" userId="6a908e1cffa05844" providerId="LiveId" clId="{9235F258-DE90-4FB1-9EFC-857F96B3346F}" dt="2024-06-17T22:39:03.085" v="497" actId="20577"/>
+          <ac:spMkLst>
+            <pc:docMk/>
+            <pc:sldMk cId="3338301109" sldId="256"/>
+            <ac:spMk id="3" creationId="{61E7EC09-24BE-BA26-3828-6F6920DA3224}"/>
+          </ac:spMkLst>
+        </pc:spChg>
+        <pc:spChg chg="add mod">
+          <ac:chgData name="Niels Mejia" userId="6a908e1cffa05844" providerId="LiveId" clId="{9235F258-DE90-4FB1-9EFC-857F96B3346F}" dt="2024-06-17T22:39:20.022" v="506" actId="20577"/>
+          <ac:spMkLst>
+            <pc:docMk/>
+            <pc:sldMk cId="3338301109" sldId="256"/>
+            <ac:spMk id="7" creationId="{AB8C3450-4564-367E-8DEA-EA354242D7A3}"/>
+          </ac:spMkLst>
+        </pc:spChg>
+        <pc:spChg chg="add mod">
+          <ac:chgData name="Niels Mejia" userId="6a908e1cffa05844" providerId="LiveId" clId="{9235F258-DE90-4FB1-9EFC-857F96B3346F}" dt="2024-06-17T22:42:57.823" v="595" actId="1076"/>
+          <ac:spMkLst>
+            <pc:docMk/>
+            <pc:sldMk cId="3338301109" sldId="256"/>
+            <ac:spMk id="19" creationId="{BDD7FA1A-7CA8-E3D4-3D69-825B037F7FCF}"/>
+          </ac:spMkLst>
+        </pc:spChg>
+        <pc:spChg chg="add mod">
+          <ac:chgData name="Niels Mejia" userId="6a908e1cffa05844" providerId="LiveId" clId="{9235F258-DE90-4FB1-9EFC-857F96B3346F}" dt="2024-06-17T22:43:28.974" v="606" actId="20577"/>
+          <ac:spMkLst>
+            <pc:docMk/>
+            <pc:sldMk cId="3338301109" sldId="256"/>
+            <ac:spMk id="26" creationId="{E3A4F1B8-A679-32E1-EB68-A823FDE26831}"/>
+          </ac:spMkLst>
+        </pc:spChg>
+        <pc:spChg chg="add mod">
+          <ac:chgData name="Niels Mejia" userId="6a908e1cffa05844" providerId="LiveId" clId="{9235F258-DE90-4FB1-9EFC-857F96B3346F}" dt="2024-06-17T22:44:16.135" v="628" actId="20577"/>
+          <ac:spMkLst>
+            <pc:docMk/>
+            <pc:sldMk cId="3338301109" sldId="256"/>
+            <ac:spMk id="28" creationId="{5332299E-9122-22C4-9D4A-086A8404F4A5}"/>
+          </ac:spMkLst>
+        </pc:spChg>
         <pc:spChg chg="mod">
-          <ac:chgData name="Niels Mejia" userId="6a908e1cffa05844" providerId="LiveId" clId="{9235F258-DE90-4FB1-9EFC-857F96B3346F}" dt="2024-06-14T20:30:19.500" v="266" actId="14100"/>
+          <ac:chgData name="Niels Mejia" userId="6a908e1cffa05844" providerId="LiveId" clId="{9235F258-DE90-4FB1-9EFC-857F96B3346F}" dt="2024-06-17T22:40:16.129" v="516" actId="14100"/>
           <ac:spMkLst>
             <pc:docMk/>
             <pc:sldMk cId="3338301109" sldId="256"/>
@@ -140,7 +193,7 @@
           </ac:spMkLst>
         </pc:spChg>
         <pc:spChg chg="mod">
-          <ac:chgData name="Niels Mejia" userId="6a908e1cffa05844" providerId="LiveId" clId="{9235F258-DE90-4FB1-9EFC-857F96B3346F}" dt="2024-06-14T20:30:25.227" v="267" actId="1076"/>
+          <ac:chgData name="Niels Mejia" userId="6a908e1cffa05844" providerId="LiveId" clId="{9235F258-DE90-4FB1-9EFC-857F96B3346F}" dt="2024-06-17T22:43:05.646" v="596" actId="1076"/>
           <ac:spMkLst>
             <pc:docMk/>
             <pc:sldMk cId="3338301109" sldId="256"/>
@@ -163,8 +216,24 @@
             <ac:spMk id="64" creationId="{D4EFD687-ED23-1B55-DE05-A490EB499FC8}"/>
           </ac:spMkLst>
         </pc:spChg>
+        <pc:cxnChg chg="add del mod">
+          <ac:chgData name="Niels Mejia" userId="6a908e1cffa05844" providerId="LiveId" clId="{9235F258-DE90-4FB1-9EFC-857F96B3346F}" dt="2024-06-17T22:41:35.131" v="567" actId="11529"/>
+          <ac:cxnSpMkLst>
+            <pc:docMk/>
+            <pc:sldMk cId="3338301109" sldId="256"/>
+            <ac:cxnSpMk id="21" creationId="{C4C48982-51F6-459A-EB83-A57120623DAD}"/>
+          </ac:cxnSpMkLst>
+        </pc:cxnChg>
+        <pc:cxnChg chg="add mod">
+          <ac:chgData name="Niels Mejia" userId="6a908e1cffa05844" providerId="LiveId" clId="{9235F258-DE90-4FB1-9EFC-857F96B3346F}" dt="2024-06-17T22:42:57.823" v="595" actId="1076"/>
+          <ac:cxnSpMkLst>
+            <pc:docMk/>
+            <pc:sldMk cId="3338301109" sldId="256"/>
+            <ac:cxnSpMk id="23" creationId="{F3358D31-8E71-4828-086E-F7F05B9A2A0F}"/>
+          </ac:cxnSpMkLst>
+        </pc:cxnChg>
         <pc:cxnChg chg="mod">
-          <ac:chgData name="Niels Mejia" userId="6a908e1cffa05844" providerId="LiveId" clId="{9235F258-DE90-4FB1-9EFC-857F96B3346F}" dt="2024-06-14T20:30:19.500" v="266" actId="14100"/>
+          <ac:chgData name="Niels Mejia" userId="6a908e1cffa05844" providerId="LiveId" clId="{9235F258-DE90-4FB1-9EFC-857F96B3346F}" dt="2024-06-17T22:40:16.129" v="516" actId="14100"/>
           <ac:cxnSpMkLst>
             <pc:docMk/>
             <pc:sldMk cId="3338301109" sldId="256"/>
@@ -181,7 +250,7 @@
         </pc:cxnChg>
       </pc:sldChg>
       <pc:sldChg chg="addSp delSp modSp new mod">
-        <pc:chgData name="Niels Mejia" userId="6a908e1cffa05844" providerId="LiveId" clId="{9235F258-DE90-4FB1-9EFC-857F96B3346F}" dt="2024-06-14T21:13:00.096" v="476" actId="20577"/>
+        <pc:chgData name="Niels Mejia" userId="6a908e1cffa05844" providerId="LiveId" clId="{9235F258-DE90-4FB1-9EFC-857F96B3346F}" dt="2024-06-17T22:45:32.174" v="653" actId="242"/>
         <pc:sldMkLst>
           <pc:docMk/>
           <pc:sldMk cId="3874538875" sldId="257"/>
@@ -202,8 +271,8 @@
             <ac:spMk id="3" creationId="{4BEED888-A8A7-23F0-1291-3E0B3F38AFCF}"/>
           </ac:spMkLst>
         </pc:spChg>
-        <pc:graphicFrameChg chg="add modGraphic">
-          <ac:chgData name="Niels Mejia" userId="6a908e1cffa05844" providerId="LiveId" clId="{9235F258-DE90-4FB1-9EFC-857F96B3346F}" dt="2024-06-14T21:13:00.096" v="476" actId="20577"/>
+        <pc:graphicFrameChg chg="add mod modGraphic">
+          <ac:chgData name="Niels Mejia" userId="6a908e1cffa05844" providerId="LiveId" clId="{9235F258-DE90-4FB1-9EFC-857F96B3346F}" dt="2024-06-17T22:45:32.174" v="653" actId="242"/>
           <ac:graphicFrameMkLst>
             <pc:docMk/>
             <pc:sldMk cId="3874538875" sldId="257"/>
@@ -365,7 +434,7 @@
           <a:p>
             <a:fld id="{0F45E69D-45D3-437D-9848-B55994C2C75F}" type="datetimeFigureOut">
               <a:rPr lang="es-PE" smtClean="0"/>
-              <a:t>14/06/2024</a:t>
+              <a:t>17/06/2024</a:t>
             </a:fld>
             <a:endParaRPr lang="es-PE"/>
           </a:p>
@@ -565,7 +634,7 @@
           <a:p>
             <a:fld id="{0F45E69D-45D3-437D-9848-B55994C2C75F}" type="datetimeFigureOut">
               <a:rPr lang="es-PE" smtClean="0"/>
-              <a:t>14/06/2024</a:t>
+              <a:t>17/06/2024</a:t>
             </a:fld>
             <a:endParaRPr lang="es-PE"/>
           </a:p>
@@ -775,7 +844,7 @@
           <a:p>
             <a:fld id="{0F45E69D-45D3-437D-9848-B55994C2C75F}" type="datetimeFigureOut">
               <a:rPr lang="es-PE" smtClean="0"/>
-              <a:t>14/06/2024</a:t>
+              <a:t>17/06/2024</a:t>
             </a:fld>
             <a:endParaRPr lang="es-PE"/>
           </a:p>
@@ -975,7 +1044,7 @@
           <a:p>
             <a:fld id="{0F45E69D-45D3-437D-9848-B55994C2C75F}" type="datetimeFigureOut">
               <a:rPr lang="es-PE" smtClean="0"/>
-              <a:t>14/06/2024</a:t>
+              <a:t>17/06/2024</a:t>
             </a:fld>
             <a:endParaRPr lang="es-PE"/>
           </a:p>
@@ -1251,7 +1320,7 @@
           <a:p>
             <a:fld id="{0F45E69D-45D3-437D-9848-B55994C2C75F}" type="datetimeFigureOut">
               <a:rPr lang="es-PE" smtClean="0"/>
-              <a:t>14/06/2024</a:t>
+              <a:t>17/06/2024</a:t>
             </a:fld>
             <a:endParaRPr lang="es-PE"/>
           </a:p>
@@ -1519,7 +1588,7 @@
           <a:p>
             <a:fld id="{0F45E69D-45D3-437D-9848-B55994C2C75F}" type="datetimeFigureOut">
               <a:rPr lang="es-PE" smtClean="0"/>
-              <a:t>14/06/2024</a:t>
+              <a:t>17/06/2024</a:t>
             </a:fld>
             <a:endParaRPr lang="es-PE"/>
           </a:p>
@@ -1934,7 +2003,7 @@
           <a:p>
             <a:fld id="{0F45E69D-45D3-437D-9848-B55994C2C75F}" type="datetimeFigureOut">
               <a:rPr lang="es-PE" smtClean="0"/>
-              <a:t>14/06/2024</a:t>
+              <a:t>17/06/2024</a:t>
             </a:fld>
             <a:endParaRPr lang="es-PE"/>
           </a:p>
@@ -2076,7 +2145,7 @@
           <a:p>
             <a:fld id="{0F45E69D-45D3-437D-9848-B55994C2C75F}" type="datetimeFigureOut">
               <a:rPr lang="es-PE" smtClean="0"/>
-              <a:t>14/06/2024</a:t>
+              <a:t>17/06/2024</a:t>
             </a:fld>
             <a:endParaRPr lang="es-PE"/>
           </a:p>
@@ -2189,7 +2258,7 @@
           <a:p>
             <a:fld id="{0F45E69D-45D3-437D-9848-B55994C2C75F}" type="datetimeFigureOut">
               <a:rPr lang="es-PE" smtClean="0"/>
-              <a:t>14/06/2024</a:t>
+              <a:t>17/06/2024</a:t>
             </a:fld>
             <a:endParaRPr lang="es-PE"/>
           </a:p>
@@ -2502,7 +2571,7 @@
           <a:p>
             <a:fld id="{0F45E69D-45D3-437D-9848-B55994C2C75F}" type="datetimeFigureOut">
               <a:rPr lang="es-PE" smtClean="0"/>
-              <a:t>14/06/2024</a:t>
+              <a:t>17/06/2024</a:t>
             </a:fld>
             <a:endParaRPr lang="es-PE"/>
           </a:p>
@@ -2791,7 +2860,7 @@
           <a:p>
             <a:fld id="{0F45E69D-45D3-437D-9848-B55994C2C75F}" type="datetimeFigureOut">
               <a:rPr lang="es-PE" smtClean="0"/>
-              <a:t>14/06/2024</a:t>
+              <a:t>17/06/2024</a:t>
             </a:fld>
             <a:endParaRPr lang="es-PE"/>
           </a:p>
@@ -3034,7 +3103,7 @@
           <a:p>
             <a:fld id="{0F45E69D-45D3-437D-9848-B55994C2C75F}" type="datetimeFigureOut">
               <a:rPr lang="es-PE" smtClean="0"/>
-              <a:t>14/06/2024</a:t>
+              <a:t>17/06/2024</a:t>
             </a:fld>
             <a:endParaRPr lang="es-PE"/>
           </a:p>
@@ -4421,8 +4490,8 @@
         </p:nvSpPr>
         <p:spPr>
           <a:xfrm>
-            <a:off x="3673981" y="5742776"/>
-            <a:ext cx="1928500" cy="882244"/>
+            <a:off x="2730622" y="5738298"/>
+            <a:ext cx="1458045" cy="882244"/>
           </a:xfrm>
           <a:prstGeom prst="roundRect">
             <a:avLst/>
@@ -4472,8 +4541,8 @@
         </p:nvCxnSpPr>
         <p:spPr>
           <a:xfrm rot="5400000">
-            <a:off x="4352298" y="3046218"/>
-            <a:ext cx="2982492" cy="2410625"/>
+            <a:off x="3765244" y="2454686"/>
+            <a:ext cx="2978014" cy="3589211"/>
           </a:xfrm>
           <a:prstGeom prst="bentConnector3">
             <a:avLst/>
@@ -4511,8 +4580,8 @@
         </p:nvSpPr>
         <p:spPr>
           <a:xfrm>
-            <a:off x="4649084" y="3843622"/>
-            <a:ext cx="1906794" cy="369332"/>
+            <a:off x="4010762" y="3900741"/>
+            <a:ext cx="3038095" cy="307777"/>
           </a:xfrm>
           <a:prstGeom prst="rect">
             <a:avLst/>
@@ -4526,8 +4595,8 @@
           <a:lstStyle/>
           <a:p>
             <a:r>
-              <a:rPr lang="es-PE" dirty="0"/>
-              <a:t>CONDENSATE</a:t>
+              <a:rPr lang="es-PE" sz="1400" dirty="0"/>
+              <a:t>CONDENSATE + LOW PRESSURE STEAM</a:t>
             </a:r>
           </a:p>
         </p:txBody>
@@ -4761,6 +4830,275 @@
             <a:r>
               <a:rPr lang="es-PE" sz="1400" dirty="0"/>
               <a:t>Ozone (O3)</a:t>
+            </a:r>
+          </a:p>
+        </p:txBody>
+      </p:sp>
+      <p:sp>
+        <p:nvSpPr>
+          <p:cNvPr id="2" name="CuadroTexto 1">
+            <a:extLst>
+              <a:ext uri="{FF2B5EF4-FFF2-40B4-BE49-F238E27FC236}">
+                <a16:creationId xmlns:a16="http://schemas.microsoft.com/office/drawing/2014/main" id="{147B1A8A-7D88-ECE1-3034-54A57B97D430}"/>
+              </a:ext>
+            </a:extLst>
+          </p:cNvPr>
+          <p:cNvSpPr txBox="1"/>
+          <p:nvPr/>
+        </p:nvSpPr>
+        <p:spPr>
+          <a:xfrm>
+            <a:off x="4188667" y="2252932"/>
+            <a:ext cx="1906794" cy="369332"/>
+          </a:xfrm>
+          <a:prstGeom prst="rect">
+            <a:avLst/>
+          </a:prstGeom>
+          <a:noFill/>
+        </p:spPr>
+        <p:txBody>
+          <a:bodyPr wrap="square" rtlCol="0">
+            <a:spAutoFit/>
+          </a:bodyPr>
+          <a:lstStyle/>
+          <a:p>
+            <a:r>
+              <a:rPr lang="es-PE" dirty="0"/>
+              <a:t>598.3 Ton/h</a:t>
+            </a:r>
+          </a:p>
+        </p:txBody>
+      </p:sp>
+      <p:sp>
+        <p:nvSpPr>
+          <p:cNvPr id="3" name="CuadroTexto 2">
+            <a:extLst>
+              <a:ext uri="{FF2B5EF4-FFF2-40B4-BE49-F238E27FC236}">
+                <a16:creationId xmlns:a16="http://schemas.microsoft.com/office/drawing/2014/main" id="{61E7EC09-24BE-BA26-3828-6F6920DA3224}"/>
+              </a:ext>
+            </a:extLst>
+          </p:cNvPr>
+          <p:cNvSpPr txBox="1"/>
+          <p:nvPr/>
+        </p:nvSpPr>
+        <p:spPr>
+          <a:xfrm>
+            <a:off x="7275900" y="3658956"/>
+            <a:ext cx="1906794" cy="369332"/>
+          </a:xfrm>
+          <a:prstGeom prst="rect">
+            <a:avLst/>
+          </a:prstGeom>
+          <a:noFill/>
+        </p:spPr>
+        <p:txBody>
+          <a:bodyPr wrap="square" rtlCol="0">
+            <a:spAutoFit/>
+          </a:bodyPr>
+          <a:lstStyle/>
+          <a:p>
+            <a:r>
+              <a:rPr lang="es-PE" dirty="0"/>
+              <a:t>284.4 Ton/h</a:t>
+            </a:r>
+          </a:p>
+        </p:txBody>
+      </p:sp>
+      <p:sp>
+        <p:nvSpPr>
+          <p:cNvPr id="7" name="CuadroTexto 6">
+            <a:extLst>
+              <a:ext uri="{FF2B5EF4-FFF2-40B4-BE49-F238E27FC236}">
+                <a16:creationId xmlns:a16="http://schemas.microsoft.com/office/drawing/2014/main" id="{AB8C3450-4564-367E-8DEA-EA354242D7A3}"/>
+              </a:ext>
+            </a:extLst>
+          </p:cNvPr>
+          <p:cNvSpPr txBox="1"/>
+          <p:nvPr/>
+        </p:nvSpPr>
+        <p:spPr>
+          <a:xfrm>
+            <a:off x="7269554" y="5349747"/>
+            <a:ext cx="1906794" cy="369332"/>
+          </a:xfrm>
+          <a:prstGeom prst="rect">
+            <a:avLst/>
+          </a:prstGeom>
+          <a:noFill/>
+        </p:spPr>
+        <p:txBody>
+          <a:bodyPr wrap="square" rtlCol="0">
+            <a:spAutoFit/>
+          </a:bodyPr>
+          <a:lstStyle/>
+          <a:p>
+            <a:r>
+              <a:rPr lang="es-PE" dirty="0"/>
+              <a:t>90.0 Ton/h</a:t>
+            </a:r>
+          </a:p>
+        </p:txBody>
+      </p:sp>
+      <p:sp>
+        <p:nvSpPr>
+          <p:cNvPr id="19" name="Rectángulo: esquinas redondeadas 18">
+            <a:extLst>
+              <a:ext uri="{FF2B5EF4-FFF2-40B4-BE49-F238E27FC236}">
+                <a16:creationId xmlns:a16="http://schemas.microsoft.com/office/drawing/2014/main" id="{BDD7FA1A-7CA8-E3D4-3D69-825B037F7FCF}"/>
+              </a:ext>
+            </a:extLst>
+          </p:cNvPr>
+          <p:cNvSpPr/>
+          <p:nvPr/>
+        </p:nvSpPr>
+        <p:spPr>
+          <a:xfrm>
+            <a:off x="4248401" y="5746718"/>
+            <a:ext cx="1787325" cy="882244"/>
+          </a:xfrm>
+          <a:prstGeom prst="roundRect">
+            <a:avLst/>
+          </a:prstGeom>
+          <a:solidFill>
+            <a:schemeClr val="accent4">
+              <a:lumMod val="75000"/>
+            </a:schemeClr>
+          </a:solidFill>
+        </p:spPr>
+        <p:style>
+          <a:lnRef idx="1">
+            <a:schemeClr val="accent3"/>
+          </a:lnRef>
+          <a:fillRef idx="2">
+            <a:schemeClr val="accent3"/>
+          </a:fillRef>
+          <a:effectRef idx="1">
+            <a:schemeClr val="accent3"/>
+          </a:effectRef>
+          <a:fontRef idx="minor">
+            <a:schemeClr val="dk1"/>
+          </a:fontRef>
+        </p:style>
+        <p:txBody>
+          <a:bodyPr rtlCol="0" anchor="ctr"/>
+          <a:lstStyle/>
+          <a:p>
+            <a:pPr algn="ctr"/>
+            <a:r>
+              <a:rPr lang="es-PE" dirty="0"/>
+              <a:t>PROCESSING UNITS AND EQUIPMENT (3)</a:t>
+            </a:r>
+          </a:p>
+        </p:txBody>
+      </p:sp>
+      <p:cxnSp>
+        <p:nvCxnSpPr>
+          <p:cNvPr id="23" name="Conector: angular 22">
+            <a:extLst>
+              <a:ext uri="{FF2B5EF4-FFF2-40B4-BE49-F238E27FC236}">
+                <a16:creationId xmlns:a16="http://schemas.microsoft.com/office/drawing/2014/main" id="{F3358D31-8E71-4828-086E-F7F05B9A2A0F}"/>
+              </a:ext>
+            </a:extLst>
+          </p:cNvPr>
+          <p:cNvCxnSpPr>
+            <a:stCxn id="5" idx="2"/>
+            <a:endCxn id="19" idx="0"/>
+          </p:cNvCxnSpPr>
+          <p:nvPr/>
+        </p:nvCxnSpPr>
+        <p:spPr>
+          <a:xfrm rot="5400000">
+            <a:off x="4602243" y="3300105"/>
+            <a:ext cx="2986434" cy="1906792"/>
+          </a:xfrm>
+          <a:prstGeom prst="bentConnector3">
+            <a:avLst/>
+          </a:prstGeom>
+          <a:ln w="19050">
+            <a:tailEnd type="triangle"/>
+          </a:ln>
+        </p:spPr>
+        <p:style>
+          <a:lnRef idx="1">
+            <a:schemeClr val="accent1"/>
+          </a:lnRef>
+          <a:fillRef idx="0">
+            <a:schemeClr val="accent1"/>
+          </a:fillRef>
+          <a:effectRef idx="0">
+            <a:schemeClr val="accent1"/>
+          </a:effectRef>
+          <a:fontRef idx="minor">
+            <a:schemeClr val="tx1"/>
+          </a:fontRef>
+        </p:style>
+      </p:cxnSp>
+      <p:sp>
+        <p:nvSpPr>
+          <p:cNvPr id="26" name="CuadroTexto 25">
+            <a:extLst>
+              <a:ext uri="{FF2B5EF4-FFF2-40B4-BE49-F238E27FC236}">
+                <a16:creationId xmlns:a16="http://schemas.microsoft.com/office/drawing/2014/main" id="{E3A4F1B8-A679-32E1-EB68-A823FDE26831}"/>
+              </a:ext>
+            </a:extLst>
+          </p:cNvPr>
+          <p:cNvSpPr txBox="1"/>
+          <p:nvPr/>
+        </p:nvSpPr>
+        <p:spPr>
+          <a:xfrm>
+            <a:off x="5361507" y="4299147"/>
+            <a:ext cx="1906794" cy="369332"/>
+          </a:xfrm>
+          <a:prstGeom prst="rect">
+            <a:avLst/>
+          </a:prstGeom>
+          <a:noFill/>
+        </p:spPr>
+        <p:txBody>
+          <a:bodyPr wrap="square" rtlCol="0">
+            <a:spAutoFit/>
+          </a:bodyPr>
+          <a:lstStyle/>
+          <a:p>
+            <a:r>
+              <a:rPr lang="es-PE" dirty="0"/>
+              <a:t>223.9 Ton/h</a:t>
+            </a:r>
+          </a:p>
+        </p:txBody>
+      </p:sp>
+      <p:sp>
+        <p:nvSpPr>
+          <p:cNvPr id="28" name="CuadroTexto 27">
+            <a:extLst>
+              <a:ext uri="{FF2B5EF4-FFF2-40B4-BE49-F238E27FC236}">
+                <a16:creationId xmlns:a16="http://schemas.microsoft.com/office/drawing/2014/main" id="{5332299E-9122-22C4-9D4A-086A8404F4A5}"/>
+              </a:ext>
+            </a:extLst>
+          </p:cNvPr>
+          <p:cNvSpPr txBox="1"/>
+          <p:nvPr/>
+        </p:nvSpPr>
+        <p:spPr>
+          <a:xfrm>
+            <a:off x="8118569" y="2249774"/>
+            <a:ext cx="1906794" cy="369332"/>
+          </a:xfrm>
+          <a:prstGeom prst="rect">
+            <a:avLst/>
+          </a:prstGeom>
+          <a:noFill/>
+        </p:spPr>
+        <p:txBody>
+          <a:bodyPr wrap="square" rtlCol="0">
+            <a:spAutoFit/>
+          </a:bodyPr>
+          <a:lstStyle/>
+          <a:p>
+            <a:r>
+              <a:rPr lang="es-PE" dirty="0"/>
+              <a:t>100 MW</a:t>
             </a:r>
           </a:p>
         </p:txBody>
@@ -4810,14 +5148,14 @@
           <p:nvPr>
             <p:extLst>
               <p:ext uri="{D42A27DB-BD31-4B8C-83A1-F6EECF244321}">
-                <p14:modId xmlns:p14="http://schemas.microsoft.com/office/powerpoint/2010/main" val="3570623"/>
+                <p14:modId xmlns:p14="http://schemas.microsoft.com/office/powerpoint/2010/main" val="3890493039"/>
               </p:ext>
             </p:extLst>
           </p:nvPr>
         </p:nvGraphicFramePr>
         <p:xfrm>
-          <a:off x="2032000" y="719666"/>
-          <a:ext cx="8127999" cy="1854200"/>
+          <a:off x="606752" y="341836"/>
+          <a:ext cx="10978497" cy="2985885"/>
         </p:xfrm>
         <a:graphic>
           <a:graphicData uri="http://schemas.openxmlformats.org/drawingml/2006/table">
@@ -4826,21 +5164,21 @@
                 <a:tableStyleId>{5C22544A-7EE6-4342-B048-85BDC9FD1C3A}</a:tableStyleId>
               </a:tblPr>
               <a:tblGrid>
-                <a:gridCol w="2709333">
+                <a:gridCol w="3659499">
                   <a:extLst>
                     <a:ext uri="{9D8B030D-6E8A-4147-A177-3AD203B41FA5}">
                       <a16:colId xmlns:a16="http://schemas.microsoft.com/office/drawing/2014/main" val="1903079773"/>
                     </a:ext>
                   </a:extLst>
                 </a:gridCol>
-                <a:gridCol w="2709333">
+                <a:gridCol w="3659499">
                   <a:extLst>
                     <a:ext uri="{9D8B030D-6E8A-4147-A177-3AD203B41FA5}">
                       <a16:colId xmlns:a16="http://schemas.microsoft.com/office/drawing/2014/main" val="417352765"/>
                     </a:ext>
                   </a:extLst>
                 </a:gridCol>
-                <a:gridCol w="2709333">
+                <a:gridCol w="3659499">
                   <a:extLst>
                     <a:ext uri="{9D8B030D-6E8A-4147-A177-3AD203B41FA5}">
                       <a16:colId xmlns:a16="http://schemas.microsoft.com/office/drawing/2014/main" val="1083579648"/>
@@ -4848,45 +5186,48 @@
                   </a:extLst>
                 </a:gridCol>
               </a:tblGrid>
-              <a:tr h="370840">
+              <a:tr h="597177">
                 <a:tc>
                   <a:txBody>
                     <a:bodyPr/>
                     <a:lstStyle/>
                     <a:p>
+                      <a:pPr algn="ctr"/>
                       <a:r>
                         <a:rPr lang="es-PE" dirty="0"/>
                         <a:t>PRODUCT</a:t>
                       </a:r>
                     </a:p>
                   </a:txBody>
-                  <a:tcPr/>
+                  <a:tcPr anchor="ctr"/>
                 </a:tc>
                 <a:tc>
                   <a:txBody>
                     <a:bodyPr/>
                     <a:lstStyle/>
                     <a:p>
+                      <a:pPr algn="ctr"/>
                       <a:r>
                         <a:rPr lang="es-PE" dirty="0"/>
                         <a:t>HEATING VALUE</a:t>
                       </a:r>
                     </a:p>
                   </a:txBody>
-                  <a:tcPr/>
+                  <a:tcPr anchor="ctr"/>
                 </a:tc>
                 <a:tc>
                   <a:txBody>
                     <a:bodyPr/>
                     <a:lstStyle/>
                     <a:p>
+                      <a:pPr algn="ctr"/>
                       <a:r>
                         <a:rPr lang="es-PE" dirty="0"/>
                         <a:t>UNIT OF MEASURE</a:t>
                       </a:r>
                     </a:p>
                   </a:txBody>
-                  <a:tcPr/>
+                  <a:tcPr anchor="ctr"/>
                 </a:tc>
                 <a:extLst>
                   <a:ext uri="{0D108BD9-81ED-4DB2-BD59-A6C34878D82A}">
@@ -4894,45 +5235,48 @@
                   </a:ext>
                 </a:extLst>
               </a:tr>
-              <a:tr h="370840">
+              <a:tr h="597177">
                 <a:tc>
                   <a:txBody>
                     <a:bodyPr/>
                     <a:lstStyle/>
                     <a:p>
+                      <a:pPr algn="ctr"/>
                       <a:r>
                         <a:rPr lang="es-PE" dirty="0"/>
                         <a:t>NATURAL GAS</a:t>
                       </a:r>
                     </a:p>
                   </a:txBody>
-                  <a:tcPr/>
+                  <a:tcPr anchor="ctr"/>
                 </a:tc>
                 <a:tc>
                   <a:txBody>
                     <a:bodyPr/>
                     <a:lstStyle/>
                     <a:p>
+                      <a:pPr algn="ctr"/>
                       <a:r>
                         <a:rPr lang="es-PE" dirty="0"/>
                         <a:t>954.963</a:t>
                       </a:r>
                     </a:p>
                   </a:txBody>
-                  <a:tcPr/>
+                  <a:tcPr anchor="ctr"/>
                 </a:tc>
                 <a:tc>
                   <a:txBody>
                     <a:bodyPr/>
                     <a:lstStyle/>
                     <a:p>
+                      <a:pPr algn="ctr"/>
                       <a:r>
                         <a:rPr lang="es-PE" dirty="0"/>
                         <a:t>BTU/SCF</a:t>
                       </a:r>
                     </a:p>
                   </a:txBody>
-                  <a:tcPr/>
+                  <a:tcPr anchor="ctr"/>
                 </a:tc>
                 <a:extLst>
                   <a:ext uri="{0D108BD9-81ED-4DB2-BD59-A6C34878D82A}">
@@ -4940,45 +5284,48 @@
                   </a:ext>
                 </a:extLst>
               </a:tr>
-              <a:tr h="370840">
+              <a:tr h="597177">
                 <a:tc>
                   <a:txBody>
                     <a:bodyPr/>
                     <a:lstStyle/>
                     <a:p>
+                      <a:pPr algn="ctr"/>
                       <a:r>
                         <a:rPr lang="es-PE" dirty="0"/>
                         <a:t>FUEL GAS</a:t>
                       </a:r>
                     </a:p>
                   </a:txBody>
-                  <a:tcPr/>
+                  <a:tcPr anchor="ctr"/>
                 </a:tc>
                 <a:tc>
                   <a:txBody>
                     <a:bodyPr/>
                     <a:lstStyle/>
                     <a:p>
+                      <a:pPr algn="ctr"/>
                       <a:r>
                         <a:rPr lang="es-PE" dirty="0"/>
                         <a:t>793.634</a:t>
                       </a:r>
                     </a:p>
                   </a:txBody>
-                  <a:tcPr/>
+                  <a:tcPr anchor="ctr"/>
                 </a:tc>
                 <a:tc>
                   <a:txBody>
                     <a:bodyPr/>
                     <a:lstStyle/>
                     <a:p>
+                      <a:pPr algn="ctr"/>
                       <a:r>
                         <a:rPr lang="es-PE" dirty="0"/>
                         <a:t>BTU/SCF</a:t>
                       </a:r>
                     </a:p>
                   </a:txBody>
-                  <a:tcPr/>
+                  <a:tcPr anchor="ctr"/>
                 </a:tc>
                 <a:extLst>
                   <a:ext uri="{0D108BD9-81ED-4DB2-BD59-A6C34878D82A}">
@@ -4986,45 +5333,48 @@
                   </a:ext>
                 </a:extLst>
               </a:tr>
-              <a:tr h="370840">
+              <a:tr h="597177">
                 <a:tc>
                   <a:txBody>
                     <a:bodyPr/>
                     <a:lstStyle/>
                     <a:p>
+                      <a:pPr algn="ctr"/>
                       <a:r>
                         <a:rPr lang="es-PE" dirty="0"/>
                         <a:t>FLEXIGAS</a:t>
                       </a:r>
                     </a:p>
                   </a:txBody>
-                  <a:tcPr/>
+                  <a:tcPr anchor="ctr"/>
                 </a:tc>
                 <a:tc>
                   <a:txBody>
                     <a:bodyPr/>
                     <a:lstStyle/>
                     <a:p>
+                      <a:pPr algn="ctr"/>
                       <a:r>
                         <a:rPr lang="es-PE" dirty="0"/>
                         <a:t>130.376</a:t>
                       </a:r>
                     </a:p>
                   </a:txBody>
-                  <a:tcPr/>
+                  <a:tcPr anchor="ctr"/>
                 </a:tc>
                 <a:tc>
                   <a:txBody>
                     <a:bodyPr/>
                     <a:lstStyle/>
                     <a:p>
+                      <a:pPr algn="ctr"/>
                       <a:r>
                         <a:rPr lang="es-PE" dirty="0"/>
                         <a:t>BTU/SCF</a:t>
                       </a:r>
                     </a:p>
                   </a:txBody>
-                  <a:tcPr/>
+                  <a:tcPr anchor="ctr"/>
                 </a:tc>
                 <a:extLst>
                   <a:ext uri="{0D108BD9-81ED-4DB2-BD59-A6C34878D82A}">
@@ -5032,46 +5382,48 @@
                   </a:ext>
                 </a:extLst>
               </a:tr>
-              <a:tr h="370840">
+              <a:tr h="597177">
                 <a:tc>
                   <a:txBody>
                     <a:bodyPr/>
                     <a:lstStyle/>
                     <a:p>
+                      <a:pPr algn="ctr"/>
                       <a:r>
                         <a:rPr lang="es-PE" dirty="0"/>
                         <a:t>LIGHT NAPHTHA</a:t>
                       </a:r>
                     </a:p>
                   </a:txBody>
-                  <a:tcPr/>
+                  <a:tcPr anchor="ctr"/>
                 </a:tc>
                 <a:tc>
                   <a:txBody>
                     <a:bodyPr/>
                     <a:lstStyle/>
                     <a:p>
+                      <a:pPr algn="ctr"/>
                       <a:r>
                         <a:rPr lang="es-PE" dirty="0"/>
                         <a:t>4’440,264</a:t>
                       </a:r>
                     </a:p>
                   </a:txBody>
-                  <a:tcPr/>
+                  <a:tcPr anchor="ctr"/>
                 </a:tc>
                 <a:tc>
                   <a:txBody>
                     <a:bodyPr/>
                     <a:lstStyle/>
                     <a:p>
+                      <a:pPr algn="ctr"/>
                       <a:r>
-                        <a:rPr lang="es-PE"/>
+                        <a:rPr lang="es-PE" dirty="0"/>
                         <a:t>BTU/BBL</a:t>
                       </a:r>
-                      <a:endParaRPr lang="es-PE" dirty="0"/>
                     </a:p>
                   </a:txBody>
-                  <a:tcPr/>
+                  <a:tcPr anchor="ctr"/>
                 </a:tc>
                 <a:extLst>
                   <a:ext uri="{0D108BD9-81ED-4DB2-BD59-A6C34878D82A}">

</xml_diff>

<commit_message>
8th Commit of the Project
</commit_message>
<xml_diff>
--- a/Niels Mejia Final Homework Presentation.pptx
+++ b/Niels Mejia Final Homework Presentation.pptx
@@ -116,7 +116,7 @@
 <file path=ppt/revisionInfo.xml><?xml version="1.0" encoding="utf-8"?>
 <p1510:revInfo xmlns:a="http://schemas.openxmlformats.org/drawingml/2006/main" xmlns:r="http://schemas.openxmlformats.org/officeDocument/2006/relationships" xmlns:p1510="http://schemas.microsoft.com/office/powerpoint/2015/10/main">
   <p1510:revLst>
-    <p1510:client id="{9235F258-DE90-4FB1-9EFC-857F96B3346F}" v="17" dt="2024-06-17T22:43:58.829"/>
+    <p1510:client id="{9235F258-DE90-4FB1-9EFC-857F96B3346F}" v="18" dt="2024-06-20T21:20:41.811"/>
   </p1510:revLst>
 </p1510:revInfo>
 </file>
@@ -126,18 +126,18 @@
   <pc:docChgLst>
     <pc:chgData name="Niels Mejia" userId="6a908e1cffa05844" providerId="LiveId" clId="{9235F258-DE90-4FB1-9EFC-857F96B3346F}"/>
     <pc:docChg chg="undo custSel addSld modSld">
-      <pc:chgData name="Niels Mejia" userId="6a908e1cffa05844" providerId="LiveId" clId="{9235F258-DE90-4FB1-9EFC-857F96B3346F}" dt="2024-06-17T22:45:32.174" v="653" actId="242"/>
+      <pc:chgData name="Niels Mejia" userId="6a908e1cffa05844" providerId="LiveId" clId="{9235F258-DE90-4FB1-9EFC-857F96B3346F}" dt="2024-06-20T21:36:49.122" v="848" actId="20577"/>
       <pc:docMkLst>
         <pc:docMk/>
       </pc:docMkLst>
       <pc:sldChg chg="addSp delSp modSp mod">
-        <pc:chgData name="Niels Mejia" userId="6a908e1cffa05844" providerId="LiveId" clId="{9235F258-DE90-4FB1-9EFC-857F96B3346F}" dt="2024-06-17T22:44:16.135" v="628" actId="20577"/>
+        <pc:chgData name="Niels Mejia" userId="6a908e1cffa05844" providerId="LiveId" clId="{9235F258-DE90-4FB1-9EFC-857F96B3346F}" dt="2024-06-20T21:36:49.122" v="848" actId="20577"/>
         <pc:sldMkLst>
           <pc:docMk/>
           <pc:sldMk cId="3338301109" sldId="256"/>
         </pc:sldMkLst>
         <pc:spChg chg="add mod">
-          <ac:chgData name="Niels Mejia" userId="6a908e1cffa05844" providerId="LiveId" clId="{9235F258-DE90-4FB1-9EFC-857F96B3346F}" dt="2024-06-17T22:38:27.386" v="489" actId="20577"/>
+          <ac:chgData name="Niels Mejia" userId="6a908e1cffa05844" providerId="LiveId" clId="{9235F258-DE90-4FB1-9EFC-857F96B3346F}" dt="2024-06-20T21:24:36.249" v="767" actId="20577"/>
           <ac:spMkLst>
             <pc:docMk/>
             <pc:sldMk cId="3338301109" sldId="256"/>
@@ -145,7 +145,7 @@
           </ac:spMkLst>
         </pc:spChg>
         <pc:spChg chg="add mod">
-          <ac:chgData name="Niels Mejia" userId="6a908e1cffa05844" providerId="LiveId" clId="{9235F258-DE90-4FB1-9EFC-857F96B3346F}" dt="2024-06-17T22:39:03.085" v="497" actId="20577"/>
+          <ac:chgData name="Niels Mejia" userId="6a908e1cffa05844" providerId="LiveId" clId="{9235F258-DE90-4FB1-9EFC-857F96B3346F}" dt="2024-06-20T21:25:17.088" v="779" actId="20577"/>
           <ac:spMkLst>
             <pc:docMk/>
             <pc:sldMk cId="3338301109" sldId="256"/>
@@ -153,11 +153,51 @@
           </ac:spMkLst>
         </pc:spChg>
         <pc:spChg chg="add mod">
-          <ac:chgData name="Niels Mejia" userId="6a908e1cffa05844" providerId="LiveId" clId="{9235F258-DE90-4FB1-9EFC-857F96B3346F}" dt="2024-06-17T22:39:20.022" v="506" actId="20577"/>
+          <ac:chgData name="Niels Mejia" userId="6a908e1cffa05844" providerId="LiveId" clId="{9235F258-DE90-4FB1-9EFC-857F96B3346F}" dt="2024-06-20T21:25:32.653" v="790" actId="20577"/>
           <ac:spMkLst>
             <pc:docMk/>
             <pc:sldMk cId="3338301109" sldId="256"/>
             <ac:spMk id="7" creationId="{AB8C3450-4564-367E-8DEA-EA354242D7A3}"/>
+          </ac:spMkLst>
+        </pc:spChg>
+        <pc:spChg chg="mod">
+          <ac:chgData name="Niels Mejia" userId="6a908e1cffa05844" providerId="LiveId" clId="{9235F258-DE90-4FB1-9EFC-857F96B3346F}" dt="2024-06-20T21:23:01.650" v="725" actId="1076"/>
+          <ac:spMkLst>
+            <pc:docMk/>
+            <pc:sldMk cId="3338301109" sldId="256"/>
+            <ac:spMk id="10" creationId="{7F42CFA7-9015-D6BD-3FD7-9B172BC49D38}"/>
+          </ac:spMkLst>
+        </pc:spChg>
+        <pc:spChg chg="add del mod">
+          <ac:chgData name="Niels Mejia" userId="6a908e1cffa05844" providerId="LiveId" clId="{9235F258-DE90-4FB1-9EFC-857F96B3346F}" dt="2024-06-20T21:22:42.458" v="709" actId="478"/>
+          <ac:spMkLst>
+            <pc:docMk/>
+            <pc:sldMk cId="3338301109" sldId="256"/>
+            <ac:spMk id="11" creationId="{9C8EE1D2-B985-A39B-06BF-C449500B6D38}"/>
+          </ac:spMkLst>
+        </pc:spChg>
+        <pc:spChg chg="mod">
+          <ac:chgData name="Niels Mejia" userId="6a908e1cffa05844" providerId="LiveId" clId="{9235F258-DE90-4FB1-9EFC-857F96B3346F}" dt="2024-06-20T21:22:38.819" v="708" actId="1076"/>
+          <ac:spMkLst>
+            <pc:docMk/>
+            <pc:sldMk cId="3338301109" sldId="256"/>
+            <ac:spMk id="12" creationId="{40F3AF6B-28AD-6F85-4D6C-7D12B0576666}"/>
+          </ac:spMkLst>
+        </pc:spChg>
+        <pc:spChg chg="mod">
+          <ac:chgData name="Niels Mejia" userId="6a908e1cffa05844" providerId="LiveId" clId="{9235F258-DE90-4FB1-9EFC-857F96B3346F}" dt="2024-06-20T21:23:34.909" v="743" actId="404"/>
+          <ac:spMkLst>
+            <pc:docMk/>
+            <pc:sldMk cId="3338301109" sldId="256"/>
+            <ac:spMk id="15" creationId="{890BCA60-1B16-BFF4-D884-3D029A7C4EDE}"/>
+          </ac:spMkLst>
+        </pc:spChg>
+        <pc:spChg chg="mod">
+          <ac:chgData name="Niels Mejia" userId="6a908e1cffa05844" providerId="LiveId" clId="{9235F258-DE90-4FB1-9EFC-857F96B3346F}" dt="2024-06-20T21:23:52.550" v="754" actId="404"/>
+          <ac:spMkLst>
+            <pc:docMk/>
+            <pc:sldMk cId="3338301109" sldId="256"/>
+            <ac:spMk id="16" creationId="{C21E5EC3-5776-27DF-C8C3-D1AD38005441}"/>
           </ac:spMkLst>
         </pc:spChg>
         <pc:spChg chg="add mod">
@@ -169,7 +209,7 @@
           </ac:spMkLst>
         </pc:spChg>
         <pc:spChg chg="add mod">
-          <ac:chgData name="Niels Mejia" userId="6a908e1cffa05844" providerId="LiveId" clId="{9235F258-DE90-4FB1-9EFC-857F96B3346F}" dt="2024-06-17T22:43:28.974" v="606" actId="20577"/>
+          <ac:chgData name="Niels Mejia" userId="6a908e1cffa05844" providerId="LiveId" clId="{9235F258-DE90-4FB1-9EFC-857F96B3346F}" dt="2024-06-20T21:25:52.317" v="802" actId="20577"/>
           <ac:spMkLst>
             <pc:docMk/>
             <pc:sldMk cId="3338301109" sldId="256"/>
@@ -177,7 +217,7 @@
           </ac:spMkLst>
         </pc:spChg>
         <pc:spChg chg="add mod">
-          <ac:chgData name="Niels Mejia" userId="6a908e1cffa05844" providerId="LiveId" clId="{9235F258-DE90-4FB1-9EFC-857F96B3346F}" dt="2024-06-17T22:44:16.135" v="628" actId="20577"/>
+          <ac:chgData name="Niels Mejia" userId="6a908e1cffa05844" providerId="LiveId" clId="{9235F258-DE90-4FB1-9EFC-857F96B3346F}" dt="2024-06-20T21:36:49.122" v="848" actId="20577"/>
           <ac:spMkLst>
             <pc:docMk/>
             <pc:sldMk cId="3338301109" sldId="256"/>
@@ -216,6 +256,14 @@
             <ac:spMk id="64" creationId="{D4EFD687-ED23-1B55-DE05-A490EB499FC8}"/>
           </ac:spMkLst>
         </pc:spChg>
+        <pc:cxnChg chg="mod">
+          <ac:chgData name="Niels Mejia" userId="6a908e1cffa05844" providerId="LiveId" clId="{9235F258-DE90-4FB1-9EFC-857F96B3346F}" dt="2024-06-20T21:22:04.034" v="691" actId="1036"/>
+          <ac:cxnSpMkLst>
+            <pc:docMk/>
+            <pc:sldMk cId="3338301109" sldId="256"/>
+            <ac:cxnSpMk id="14" creationId="{EF02B844-65FF-5A4C-A3ED-FD7672982316}"/>
+          </ac:cxnSpMkLst>
+        </pc:cxnChg>
         <pc:cxnChg chg="add del mod">
           <ac:chgData name="Niels Mejia" userId="6a908e1cffa05844" providerId="LiveId" clId="{9235F258-DE90-4FB1-9EFC-857F96B3346F}" dt="2024-06-17T22:41:35.131" v="567" actId="11529"/>
           <ac:cxnSpMkLst>
@@ -434,7 +482,7 @@
           <a:p>
             <a:fld id="{0F45E69D-45D3-437D-9848-B55994C2C75F}" type="datetimeFigureOut">
               <a:rPr lang="es-PE" smtClean="0"/>
-              <a:t>17/06/2024</a:t>
+              <a:t>20/06/2024</a:t>
             </a:fld>
             <a:endParaRPr lang="es-PE"/>
           </a:p>
@@ -634,7 +682,7 @@
           <a:p>
             <a:fld id="{0F45E69D-45D3-437D-9848-B55994C2C75F}" type="datetimeFigureOut">
               <a:rPr lang="es-PE" smtClean="0"/>
-              <a:t>17/06/2024</a:t>
+              <a:t>20/06/2024</a:t>
             </a:fld>
             <a:endParaRPr lang="es-PE"/>
           </a:p>
@@ -844,7 +892,7 @@
           <a:p>
             <a:fld id="{0F45E69D-45D3-437D-9848-B55994C2C75F}" type="datetimeFigureOut">
               <a:rPr lang="es-PE" smtClean="0"/>
-              <a:t>17/06/2024</a:t>
+              <a:t>20/06/2024</a:t>
             </a:fld>
             <a:endParaRPr lang="es-PE"/>
           </a:p>
@@ -1044,7 +1092,7 @@
           <a:p>
             <a:fld id="{0F45E69D-45D3-437D-9848-B55994C2C75F}" type="datetimeFigureOut">
               <a:rPr lang="es-PE" smtClean="0"/>
-              <a:t>17/06/2024</a:t>
+              <a:t>20/06/2024</a:t>
             </a:fld>
             <a:endParaRPr lang="es-PE"/>
           </a:p>
@@ -1320,7 +1368,7 @@
           <a:p>
             <a:fld id="{0F45E69D-45D3-437D-9848-B55994C2C75F}" type="datetimeFigureOut">
               <a:rPr lang="es-PE" smtClean="0"/>
-              <a:t>17/06/2024</a:t>
+              <a:t>20/06/2024</a:t>
             </a:fld>
             <a:endParaRPr lang="es-PE"/>
           </a:p>
@@ -1588,7 +1636,7 @@
           <a:p>
             <a:fld id="{0F45E69D-45D3-437D-9848-B55994C2C75F}" type="datetimeFigureOut">
               <a:rPr lang="es-PE" smtClean="0"/>
-              <a:t>17/06/2024</a:t>
+              <a:t>20/06/2024</a:t>
             </a:fld>
             <a:endParaRPr lang="es-PE"/>
           </a:p>
@@ -2003,7 +2051,7 @@
           <a:p>
             <a:fld id="{0F45E69D-45D3-437D-9848-B55994C2C75F}" type="datetimeFigureOut">
               <a:rPr lang="es-PE" smtClean="0"/>
-              <a:t>17/06/2024</a:t>
+              <a:t>20/06/2024</a:t>
             </a:fld>
             <a:endParaRPr lang="es-PE"/>
           </a:p>
@@ -2145,7 +2193,7 @@
           <a:p>
             <a:fld id="{0F45E69D-45D3-437D-9848-B55994C2C75F}" type="datetimeFigureOut">
               <a:rPr lang="es-PE" smtClean="0"/>
-              <a:t>17/06/2024</a:t>
+              <a:t>20/06/2024</a:t>
             </a:fld>
             <a:endParaRPr lang="es-PE"/>
           </a:p>
@@ -2258,7 +2306,7 @@
           <a:p>
             <a:fld id="{0F45E69D-45D3-437D-9848-B55994C2C75F}" type="datetimeFigureOut">
               <a:rPr lang="es-PE" smtClean="0"/>
-              <a:t>17/06/2024</a:t>
+              <a:t>20/06/2024</a:t>
             </a:fld>
             <a:endParaRPr lang="es-PE"/>
           </a:p>
@@ -2571,7 +2619,7 @@
           <a:p>
             <a:fld id="{0F45E69D-45D3-437D-9848-B55994C2C75F}" type="datetimeFigureOut">
               <a:rPr lang="es-PE" smtClean="0"/>
-              <a:t>17/06/2024</a:t>
+              <a:t>20/06/2024</a:t>
             </a:fld>
             <a:endParaRPr lang="es-PE"/>
           </a:p>
@@ -2860,7 +2908,7 @@
           <a:p>
             <a:fld id="{0F45E69D-45D3-437D-9848-B55994C2C75F}" type="datetimeFigureOut">
               <a:rPr lang="es-PE" smtClean="0"/>
-              <a:t>17/06/2024</a:t>
+              <a:t>20/06/2024</a:t>
             </a:fld>
             <a:endParaRPr lang="es-PE"/>
           </a:p>
@@ -3103,7 +3151,7 @@
           <a:p>
             <a:fld id="{0F45E69D-45D3-437D-9848-B55994C2C75F}" type="datetimeFigureOut">
               <a:rPr lang="es-PE" smtClean="0"/>
-              <a:t>17/06/2024</a:t>
+              <a:t>20/06/2024</a:t>
             </a:fld>
             <a:endParaRPr lang="es-PE"/>
           </a:p>
@@ -3759,8 +3807,8 @@
         </p:nvSpPr>
         <p:spPr>
           <a:xfrm>
-            <a:off x="176550" y="1135765"/>
-            <a:ext cx="1501950" cy="369332"/>
+            <a:off x="176549" y="1114463"/>
+            <a:ext cx="1854418" cy="276999"/>
           </a:xfrm>
           <a:prstGeom prst="rect">
             <a:avLst/>
@@ -3774,8 +3822,8 @@
           <a:lstStyle/>
           <a:p>
             <a:r>
-              <a:rPr lang="es-PE" dirty="0"/>
-              <a:t>NATURAL GAS</a:t>
+              <a:rPr lang="es-PE" sz="1200" dirty="0"/>
+              <a:t>NATURAL GAS = 21.5 BFOE</a:t>
             </a:r>
           </a:p>
         </p:txBody>
@@ -3794,8 +3842,8 @@
         </p:nvSpPr>
         <p:spPr>
           <a:xfrm>
-            <a:off x="176550" y="1564641"/>
-            <a:ext cx="1085554" cy="369332"/>
+            <a:off x="176549" y="1590152"/>
+            <a:ext cx="1653273" cy="276999"/>
           </a:xfrm>
           <a:prstGeom prst="rect">
             <a:avLst/>
@@ -3809,8 +3857,8 @@
           <a:lstStyle/>
           <a:p>
             <a:r>
-              <a:rPr lang="es-PE" dirty="0"/>
-              <a:t>FUEL GAS</a:t>
+              <a:rPr lang="es-PE" sz="1200" dirty="0"/>
+              <a:t>FUEL GAS = 504.3 BFOE</a:t>
             </a:r>
           </a:p>
         </p:txBody>
@@ -3868,7 +3916,7 @@
         </p:nvCxnSpPr>
         <p:spPr>
           <a:xfrm>
-            <a:off x="290556" y="2862341"/>
+            <a:off x="290556" y="3033261"/>
             <a:ext cx="1632247" cy="0"/>
           </a:xfrm>
           <a:prstGeom prst="straightConnector1">
@@ -3908,7 +3956,7 @@
         <p:spPr>
           <a:xfrm>
             <a:off x="176550" y="2061227"/>
-            <a:ext cx="1063112" cy="369332"/>
+            <a:ext cx="1754263" cy="276999"/>
           </a:xfrm>
           <a:prstGeom prst="rect">
             <a:avLst/>
@@ -3922,8 +3970,8 @@
           <a:lstStyle/>
           <a:p>
             <a:r>
-              <a:rPr lang="es-PE" dirty="0"/>
-              <a:t>FLEXIGAS</a:t>
+              <a:rPr lang="es-PE" sz="1200" dirty="0"/>
+              <a:t>FLEXIGAS = 3,133.8 BFOE</a:t>
             </a:r>
           </a:p>
         </p:txBody>
@@ -3942,8 +3990,8 @@
         </p:nvSpPr>
         <p:spPr>
           <a:xfrm>
-            <a:off x="176550" y="2488517"/>
-            <a:ext cx="1729961" cy="369332"/>
+            <a:off x="176550" y="2659437"/>
+            <a:ext cx="1710725" cy="276999"/>
           </a:xfrm>
           <a:prstGeom prst="rect">
             <a:avLst/>
@@ -3957,8 +4005,8 @@
           <a:lstStyle/>
           <a:p>
             <a:r>
-              <a:rPr lang="es-PE" dirty="0"/>
-              <a:t>LIGHT NAPHTHA</a:t>
+              <a:rPr lang="es-PE" sz="1200" dirty="0"/>
+              <a:t>LIGHT NAPHTHA = 0 BBL</a:t>
             </a:r>
           </a:p>
         </p:txBody>
@@ -4864,7 +4912,7 @@
           <a:p>
             <a:r>
               <a:rPr lang="es-PE" dirty="0"/>
-              <a:t>598.3 Ton/h</a:t>
+              <a:t>15,359 Ton/d</a:t>
             </a:r>
           </a:p>
         </p:txBody>
@@ -4899,7 +4947,7 @@
           <a:p>
             <a:r>
               <a:rPr lang="es-PE" dirty="0"/>
-              <a:t>284.4 Ton/h</a:t>
+              <a:t>6,826 Ton/d</a:t>
             </a:r>
           </a:p>
         </p:txBody>
@@ -4934,7 +4982,7 @@
           <a:p>
             <a:r>
               <a:rPr lang="es-PE" dirty="0"/>
-              <a:t>90.0 Ton/h</a:t>
+              <a:t>2,160 Ton/d</a:t>
             </a:r>
           </a:p>
         </p:txBody>
@@ -5063,7 +5111,7 @@
           <a:p>
             <a:r>
               <a:rPr lang="es-PE" dirty="0"/>
-              <a:t>223.9 Ton/h</a:t>
+              <a:t>5,374 Ton/d</a:t>
             </a:r>
           </a:p>
         </p:txBody>
@@ -5083,7 +5131,7 @@
         <p:spPr>
           <a:xfrm>
             <a:off x="8118569" y="2249774"/>
-            <a:ext cx="1906794" cy="369332"/>
+            <a:ext cx="1906794" cy="523220"/>
           </a:xfrm>
           <a:prstGeom prst="rect">
             <a:avLst/>
@@ -5097,8 +5145,14 @@
           <a:lstStyle/>
           <a:p>
             <a:r>
-              <a:rPr lang="es-PE" dirty="0"/>
-              <a:t>100 MW</a:t>
+              <a:rPr lang="es-PE" sz="1400" dirty="0"/>
+              <a:t>Potencia = 100 MW</a:t>
+            </a:r>
+          </a:p>
+          <a:p>
+            <a:r>
+              <a:rPr lang="es-PE" sz="1400" dirty="0"/>
+              <a:t>Energía = 1,354 BFOE/d</a:t>
             </a:r>
           </a:p>
         </p:txBody>

</xml_diff>